<commit_message>
final report of analysis
</commit_message>
<xml_diff>
--- a/3_presentation/Murdered hip-hop rappers.pptx
+++ b/3_presentation/Murdered hip-hop rappers.pptx
@@ -16,6 +16,7 @@
     <p:sldId id="266" r:id="rId10"/>
     <p:sldId id="264" r:id="rId11"/>
     <p:sldId id="265" r:id="rId12"/>
+    <p:sldId id="267" r:id="rId13"/>
   </p:sldIdLst>
   <p:sldSz cx="12192000" cy="6858000"/>
   <p:notesSz cx="6858000" cy="9144000"/>
@@ -130,9 +131,13 @@
             <p14:sldId id="266"/>
             <p14:sldId id="264"/>
             <p14:sldId id="265"/>
+            <p14:sldId id="267"/>
           </p14:sldIdLst>
         </p14:section>
       </p14:sectionLst>
+    </p:ext>
+    <p:ext uri="{EFAFB233-063F-42B5-8137-9DF3F51BA10A}">
+      <p15:sldGuideLst xmlns:p15="http://schemas.microsoft.com/office/powerpoint/2012/main"/>
     </p:ext>
   </p:extLst>
 </p:presentation>
@@ -285,7 +290,7 @@
           <a:p>
             <a:fld id="{8A82E311-E6E7-4C0E-A0FE-7FA6FEDED981}" type="datetimeFigureOut">
               <a:rPr lang="en-US" smtClean="0"/>
-              <a:t>11/6/2022</a:t>
+              <a:t>11/21/2022</a:t>
             </a:fld>
             <a:endParaRPr lang="en-US"/>
           </a:p>
@@ -483,7 +488,7 @@
           <a:p>
             <a:fld id="{8A82E311-E6E7-4C0E-A0FE-7FA6FEDED981}" type="datetimeFigureOut">
               <a:rPr lang="en-US" smtClean="0"/>
-              <a:t>11/6/2022</a:t>
+              <a:t>11/21/2022</a:t>
             </a:fld>
             <a:endParaRPr lang="en-US"/>
           </a:p>
@@ -691,7 +696,7 @@
           <a:p>
             <a:fld id="{8A82E311-E6E7-4C0E-A0FE-7FA6FEDED981}" type="datetimeFigureOut">
               <a:rPr lang="en-US" smtClean="0"/>
-              <a:t>11/6/2022</a:t>
+              <a:t>11/21/2022</a:t>
             </a:fld>
             <a:endParaRPr lang="en-US"/>
           </a:p>
@@ -889,7 +894,7 @@
           <a:p>
             <a:fld id="{8A82E311-E6E7-4C0E-A0FE-7FA6FEDED981}" type="datetimeFigureOut">
               <a:rPr lang="en-US" smtClean="0"/>
-              <a:t>11/6/2022</a:t>
+              <a:t>11/21/2022</a:t>
             </a:fld>
             <a:endParaRPr lang="en-US"/>
           </a:p>
@@ -1164,7 +1169,7 @@
           <a:p>
             <a:fld id="{8A82E311-E6E7-4C0E-A0FE-7FA6FEDED981}" type="datetimeFigureOut">
               <a:rPr lang="en-US" smtClean="0"/>
-              <a:t>11/6/2022</a:t>
+              <a:t>11/21/2022</a:t>
             </a:fld>
             <a:endParaRPr lang="en-US"/>
           </a:p>
@@ -1429,7 +1434,7 @@
           <a:p>
             <a:fld id="{8A82E311-E6E7-4C0E-A0FE-7FA6FEDED981}" type="datetimeFigureOut">
               <a:rPr lang="en-US" smtClean="0"/>
-              <a:t>11/6/2022</a:t>
+              <a:t>11/21/2022</a:t>
             </a:fld>
             <a:endParaRPr lang="en-US"/>
           </a:p>
@@ -1841,7 +1846,7 @@
           <a:p>
             <a:fld id="{8A82E311-E6E7-4C0E-A0FE-7FA6FEDED981}" type="datetimeFigureOut">
               <a:rPr lang="en-US" smtClean="0"/>
-              <a:t>11/6/2022</a:t>
+              <a:t>11/21/2022</a:t>
             </a:fld>
             <a:endParaRPr lang="en-US"/>
           </a:p>
@@ -1982,7 +1987,7 @@
           <a:p>
             <a:fld id="{8A82E311-E6E7-4C0E-A0FE-7FA6FEDED981}" type="datetimeFigureOut">
               <a:rPr lang="en-US" smtClean="0"/>
-              <a:t>11/6/2022</a:t>
+              <a:t>11/21/2022</a:t>
             </a:fld>
             <a:endParaRPr lang="en-US"/>
           </a:p>
@@ -2095,7 +2100,7 @@
           <a:p>
             <a:fld id="{8A82E311-E6E7-4C0E-A0FE-7FA6FEDED981}" type="datetimeFigureOut">
               <a:rPr lang="en-US" smtClean="0"/>
-              <a:t>11/6/2022</a:t>
+              <a:t>11/21/2022</a:t>
             </a:fld>
             <a:endParaRPr lang="en-US"/>
           </a:p>
@@ -2406,7 +2411,7 @@
           <a:p>
             <a:fld id="{8A82E311-E6E7-4C0E-A0FE-7FA6FEDED981}" type="datetimeFigureOut">
               <a:rPr lang="en-US" smtClean="0"/>
-              <a:t>11/6/2022</a:t>
+              <a:t>11/21/2022</a:t>
             </a:fld>
             <a:endParaRPr lang="en-US"/>
           </a:p>
@@ -2694,7 +2699,7 @@
           <a:p>
             <a:fld id="{8A82E311-E6E7-4C0E-A0FE-7FA6FEDED981}" type="datetimeFigureOut">
               <a:rPr lang="en-US" smtClean="0"/>
-              <a:t>11/6/2022</a:t>
+              <a:t>11/21/2022</a:t>
             </a:fld>
             <a:endParaRPr lang="en-US"/>
           </a:p>
@@ -2935,7 +2940,7 @@
           <a:p>
             <a:fld id="{8A82E311-E6E7-4C0E-A0FE-7FA6FEDED981}" type="datetimeFigureOut">
               <a:rPr lang="en-US" smtClean="0"/>
-              <a:t>11/6/2022</a:t>
+              <a:t>11/21/2022</a:t>
             </a:fld>
             <a:endParaRPr lang="en-US"/>
           </a:p>
@@ -3617,6 +3622,108 @@
 </p:sld>
 </file>
 
+<file path=ppt/slides/slide12.xml><?xml version="1.0" encoding="utf-8"?>
+<p:sld xmlns:a="http://schemas.openxmlformats.org/drawingml/2006/main" xmlns:r="http://schemas.openxmlformats.org/officeDocument/2006/relationships" xmlns:p="http://schemas.openxmlformats.org/presentationml/2006/main">
+  <p:cSld>
+    <p:spTree>
+      <p:nvGrpSpPr>
+        <p:cNvPr id="1" name=""/>
+        <p:cNvGrpSpPr/>
+        <p:nvPr/>
+      </p:nvGrpSpPr>
+      <p:grpSpPr>
+        <a:xfrm>
+          <a:off x="0" y="0"/>
+          <a:ext cx="0" cy="0"/>
+          <a:chOff x="0" y="0"/>
+          <a:chExt cx="0" cy="0"/>
+        </a:xfrm>
+      </p:grpSpPr>
+      <p:sp>
+        <p:nvSpPr>
+          <p:cNvPr id="2" name="Title 1">
+            <a:extLst>
+              <a:ext uri="{FF2B5EF4-FFF2-40B4-BE49-F238E27FC236}">
+                <a16:creationId xmlns:a16="http://schemas.microsoft.com/office/drawing/2014/main" id="{06C9C627-D8F5-2E42-6437-C61E4D357FAD}"/>
+              </a:ext>
+            </a:extLst>
+          </p:cNvPr>
+          <p:cNvSpPr>
+            <a:spLocks noGrp="1"/>
+          </p:cNvSpPr>
+          <p:nvPr>
+            <p:ph type="title"/>
+          </p:nvPr>
+        </p:nvSpPr>
+        <p:spPr/>
+        <p:txBody>
+          <a:bodyPr/>
+          <a:lstStyle/>
+          <a:p>
+            <a:r>
+              <a:rPr lang="en-US" dirty="0"/>
+              <a:t>Link </a:t>
+            </a:r>
+            <a:r>
+              <a:rPr lang="en-US"/>
+              <a:t>to Analysis Report</a:t>
+            </a:r>
+            <a:endParaRPr lang="en-US" dirty="0"/>
+          </a:p>
+        </p:txBody>
+      </p:sp>
+      <p:sp>
+        <p:nvSpPr>
+          <p:cNvPr id="3" name="Content Placeholder 2">
+            <a:extLst>
+              <a:ext uri="{FF2B5EF4-FFF2-40B4-BE49-F238E27FC236}">
+                <a16:creationId xmlns:a16="http://schemas.microsoft.com/office/drawing/2014/main" id="{696E350D-4E53-CC8F-6C9C-39079BCA2E22}"/>
+              </a:ext>
+            </a:extLst>
+          </p:cNvPr>
+          <p:cNvSpPr>
+            <a:spLocks noGrp="1"/>
+          </p:cNvSpPr>
+          <p:nvPr>
+            <p:ph sz="half" idx="1"/>
+          </p:nvPr>
+        </p:nvSpPr>
+        <p:spPr>
+          <a:xfrm>
+            <a:off x="838200" y="1825625"/>
+            <a:ext cx="10744200" cy="1076601"/>
+          </a:xfrm>
+        </p:spPr>
+        <p:txBody>
+          <a:bodyPr/>
+          <a:lstStyle/>
+          <a:p>
+            <a:pPr marL="0" indent="0">
+              <a:buNone/>
+            </a:pPr>
+            <a:r>
+              <a:rPr lang="en-US" dirty="0">
+                <a:hlinkClick r:id="rId2"/>
+              </a:rPr>
+              <a:t>Analysis</a:t>
+            </a:r>
+            <a:endParaRPr lang="en-US" dirty="0"/>
+          </a:p>
+        </p:txBody>
+      </p:sp>
+    </p:spTree>
+    <p:extLst>
+      <p:ext uri="{BB962C8B-B14F-4D97-AF65-F5344CB8AC3E}">
+        <p14:creationId xmlns:p14="http://schemas.microsoft.com/office/powerpoint/2010/main" val="1009973645"/>
+      </p:ext>
+    </p:extLst>
+  </p:cSld>
+  <p:clrMapOvr>
+    <a:masterClrMapping/>
+  </p:clrMapOvr>
+</p:sld>
+</file>
+
 <file path=ppt/slides/slide2.xml><?xml version="1.0" encoding="utf-8"?>
 <p:sld xmlns:a="http://schemas.openxmlformats.org/drawingml/2006/main" xmlns:r="http://schemas.openxmlformats.org/officeDocument/2006/relationships" xmlns:p="http://schemas.openxmlformats.org/presentationml/2006/main">
   <p:cSld>
@@ -3996,10 +4103,10 @@
       </p:sp>
       <p:pic>
         <p:nvPicPr>
-          <p:cNvPr id="6" name="Content Placeholder 5">
-            <a:extLst>
-              <a:ext uri="{FF2B5EF4-FFF2-40B4-BE49-F238E27FC236}">
-                <a16:creationId xmlns:a16="http://schemas.microsoft.com/office/drawing/2014/main" id="{5BF5521F-4828-9347-8881-54750C999EC0}"/>
+          <p:cNvPr id="7" name="Content Placeholder 6">
+            <a:extLst>
+              <a:ext uri="{FF2B5EF4-FFF2-40B4-BE49-F238E27FC236}">
+                <a16:creationId xmlns:a16="http://schemas.microsoft.com/office/drawing/2014/main" id="{855677EF-4EBA-1591-3CE1-67296DBA5C00}"/>
               </a:ext>
             </a:extLst>
           </p:cNvPr>
@@ -4024,8 +4131,8 @@
         </p:blipFill>
         <p:spPr>
           <a:xfrm>
-            <a:off x="3671668" y="1690688"/>
-            <a:ext cx="7287063" cy="4963330"/>
+            <a:off x="1192695" y="1690688"/>
+            <a:ext cx="9978887" cy="4577589"/>
           </a:xfrm>
         </p:spPr>
       </p:pic>
@@ -4092,76 +4199,6 @@
           </a:p>
         </p:txBody>
       </p:sp>
-      <p:pic>
-        <p:nvPicPr>
-          <p:cNvPr id="8" name="Content Placeholder 7">
-            <a:extLst>
-              <a:ext uri="{FF2B5EF4-FFF2-40B4-BE49-F238E27FC236}">
-                <a16:creationId xmlns:a16="http://schemas.microsoft.com/office/drawing/2014/main" id="{75353977-5562-7B77-4B8E-C5FAF5BBB512}"/>
-              </a:ext>
-            </a:extLst>
-          </p:cNvPr>
-          <p:cNvPicPr>
-            <a:picLocks noGrp="1" noChangeAspect="1"/>
-          </p:cNvPicPr>
-          <p:nvPr>
-            <p:ph sz="half" idx="2"/>
-          </p:nvPr>
-        </p:nvPicPr>
-        <p:blipFill>
-          <a:blip r:embed="rId2">
-            <a:extLst>
-              <a:ext uri="{28A0092B-C50C-407E-A947-70E740481C1C}">
-                <a14:useLocalDpi xmlns:a14="http://schemas.microsoft.com/office/drawing/2010/main" val="0"/>
-              </a:ext>
-            </a:extLst>
-          </a:blip>
-          <a:stretch>
-            <a:fillRect/>
-          </a:stretch>
-        </p:blipFill>
-        <p:spPr>
-          <a:xfrm>
-            <a:off x="7225783" y="1364810"/>
-            <a:ext cx="4792394" cy="4935321"/>
-          </a:xfrm>
-        </p:spPr>
-      </p:pic>
-      <p:pic>
-        <p:nvPicPr>
-          <p:cNvPr id="12" name="Content Placeholder 11">
-            <a:extLst>
-              <a:ext uri="{FF2B5EF4-FFF2-40B4-BE49-F238E27FC236}">
-                <a16:creationId xmlns:a16="http://schemas.microsoft.com/office/drawing/2014/main" id="{D8DD6134-E311-84F0-86F2-1C1C7C387C10}"/>
-              </a:ext>
-            </a:extLst>
-          </p:cNvPr>
-          <p:cNvPicPr>
-            <a:picLocks noGrp="1" noChangeAspect="1"/>
-          </p:cNvPicPr>
-          <p:nvPr>
-            <p:ph sz="half" idx="1"/>
-          </p:nvPr>
-        </p:nvPicPr>
-        <p:blipFill>
-          <a:blip r:embed="rId3">
-            <a:extLst>
-              <a:ext uri="{28A0092B-C50C-407E-A947-70E740481C1C}">
-                <a14:useLocalDpi xmlns:a14="http://schemas.microsoft.com/office/drawing/2010/main" val="0"/>
-              </a:ext>
-            </a:extLst>
-          </a:blip>
-          <a:stretch>
-            <a:fillRect/>
-          </a:stretch>
-        </p:blipFill>
-        <p:spPr>
-          <a:xfrm>
-            <a:off x="173824" y="1364811"/>
-            <a:ext cx="6719345" cy="4698364"/>
-          </a:xfrm>
-        </p:spPr>
-      </p:pic>
       <p:sp>
         <p:nvSpPr>
           <p:cNvPr id="13" name="Title 1">
@@ -4264,6 +4301,76 @@
           </a:fontRef>
         </p:style>
       </p:cxnSp>
+      <p:pic>
+        <p:nvPicPr>
+          <p:cNvPr id="6" name="Content Placeholder 5">
+            <a:extLst>
+              <a:ext uri="{FF2B5EF4-FFF2-40B4-BE49-F238E27FC236}">
+                <a16:creationId xmlns:a16="http://schemas.microsoft.com/office/drawing/2014/main" id="{B8CE4571-A2FB-7990-63AF-2ACF4B3521B7}"/>
+              </a:ext>
+            </a:extLst>
+          </p:cNvPr>
+          <p:cNvPicPr>
+            <a:picLocks noGrp="1" noChangeAspect="1"/>
+          </p:cNvPicPr>
+          <p:nvPr>
+            <p:ph sz="half" idx="2"/>
+          </p:nvPr>
+        </p:nvPicPr>
+        <p:blipFill>
+          <a:blip r:embed="rId2">
+            <a:extLst>
+              <a:ext uri="{28A0092B-C50C-407E-A947-70E740481C1C}">
+                <a14:useLocalDpi xmlns:a14="http://schemas.microsoft.com/office/drawing/2010/main" val="0"/>
+              </a:ext>
+            </a:extLst>
+          </a:blip>
+          <a:stretch>
+            <a:fillRect/>
+          </a:stretch>
+        </p:blipFill>
+        <p:spPr>
+          <a:xfrm>
+            <a:off x="7108229" y="1364811"/>
+            <a:ext cx="4909945" cy="4812152"/>
+          </a:xfrm>
+        </p:spPr>
+      </p:pic>
+      <p:pic>
+        <p:nvPicPr>
+          <p:cNvPr id="11" name="Content Placeholder 10">
+            <a:extLst>
+              <a:ext uri="{FF2B5EF4-FFF2-40B4-BE49-F238E27FC236}">
+                <a16:creationId xmlns:a16="http://schemas.microsoft.com/office/drawing/2014/main" id="{33A4AFAB-1E6B-7791-F45E-48962CCF18E0}"/>
+              </a:ext>
+            </a:extLst>
+          </p:cNvPr>
+          <p:cNvPicPr>
+            <a:picLocks noGrp="1" noChangeAspect="1"/>
+          </p:cNvPicPr>
+          <p:nvPr>
+            <p:ph sz="half" idx="1"/>
+          </p:nvPr>
+        </p:nvPicPr>
+        <p:blipFill>
+          <a:blip r:embed="rId3">
+            <a:extLst>
+              <a:ext uri="{28A0092B-C50C-407E-A947-70E740481C1C}">
+                <a14:useLocalDpi xmlns:a14="http://schemas.microsoft.com/office/drawing/2010/main" val="0"/>
+              </a:ext>
+            </a:extLst>
+          </a:blip>
+          <a:stretch>
+            <a:fillRect/>
+          </a:stretch>
+        </p:blipFill>
+        <p:spPr>
+          <a:xfrm>
+            <a:off x="-1" y="1550504"/>
+            <a:ext cx="7000699" cy="4121425"/>
+          </a:xfrm>
+        </p:spPr>
+      </p:pic>
     </p:spTree>
     <p:extLst>
       <p:ext uri="{BB962C8B-B14F-4D97-AF65-F5344CB8AC3E}">
@@ -4359,7 +4466,7 @@
         </p:blipFill>
         <p:spPr>
           <a:xfrm>
-            <a:off x="4600135" y="253218"/>
+            <a:off x="4494118" y="186957"/>
             <a:ext cx="6963508" cy="6239657"/>
           </a:xfrm>
         </p:spPr>

</xml_diff>